<commit_message>
Commenti Pustina su PP
</commit_message>
<xml_diff>
--- a/1895955_1884561 project/presentation/1895955_1884561.pptx
+++ b/1895955_1884561 project/presentation/1895955_1884561.pptx
@@ -1003,6 +1003,969 @@
           <a:bodyPr/>
           <a:lstStyle/>
           <a:p>
+            <a:r>
+              <a:rPr lang="en-US" dirty="0" err="1"/>
+              <a:t>Espandere</a:t>
+            </a:r>
+            <a:r>
+              <a:rPr lang="en-US" dirty="0"/>
+              <a:t> </a:t>
+            </a:r>
+            <a:r>
+              <a:rPr lang="en-US" dirty="0" err="1"/>
+              <a:t>parte</a:t>
+            </a:r>
+            <a:r>
+              <a:rPr lang="en-US" dirty="0"/>
+              <a:t> </a:t>
+            </a:r>
+            <a:r>
+              <a:rPr lang="en-US" dirty="0" err="1"/>
+              <a:t>teorica</a:t>
+            </a:r>
+            <a:r>
+              <a:rPr lang="en-US" dirty="0"/>
+              <a:t> + </a:t>
+            </a:r>
+            <a:r>
+              <a:rPr lang="en-US" dirty="0" err="1"/>
+              <a:t>aggiungere</a:t>
+            </a:r>
+            <a:r>
+              <a:rPr lang="en-US" dirty="0"/>
+              <a:t> il </a:t>
+            </a:r>
+            <a:r>
+              <a:rPr lang="en-US" dirty="0" err="1"/>
+              <a:t>controllore</a:t>
+            </a:r>
+            <a:r>
+              <a:rPr lang="en-US" dirty="0"/>
+              <a:t> PD per il </a:t>
+            </a:r>
+            <a:r>
+              <a:rPr lang="en-US" dirty="0" err="1"/>
+              <a:t>caso</a:t>
+            </a:r>
+            <a:r>
+              <a:rPr lang="en-US" dirty="0"/>
+              <a:t> </a:t>
+            </a:r>
+            <a:r>
+              <a:rPr lang="en-US" dirty="0" err="1"/>
+              <a:t>rigido</a:t>
+            </a:r>
+            <a:r>
+              <a:rPr lang="en-US" dirty="0"/>
+              <a:t> + focus </a:t>
+            </a:r>
+            <a:r>
+              <a:rPr lang="en-US" dirty="0" err="1"/>
+              <a:t>su</a:t>
+            </a:r>
+            <a:r>
+              <a:rPr lang="en-US" dirty="0"/>
+              <a:t> </a:t>
+            </a:r>
+            <a:r>
+              <a:rPr lang="en-US" dirty="0" err="1"/>
+              <a:t>una</a:t>
+            </a:r>
+            <a:r>
+              <a:rPr lang="en-US" dirty="0"/>
+              <a:t> </a:t>
+            </a:r>
+            <a:r>
+              <a:rPr lang="en-US" dirty="0" err="1"/>
+              <a:t>traiettoria</a:t>
+            </a:r>
+            <a:r>
+              <a:rPr lang="en-US" dirty="0"/>
+              <a:t> (</a:t>
+            </a:r>
+            <a:r>
+              <a:rPr lang="en-US" dirty="0" err="1"/>
+              <a:t>grafici</a:t>
+            </a:r>
+            <a:r>
+              <a:rPr lang="en-US" dirty="0"/>
+              <a:t> + </a:t>
+            </a:r>
+            <a:r>
+              <a:rPr lang="en-US" dirty="0" err="1"/>
+              <a:t>rmse</a:t>
+            </a:r>
+            <a:r>
+              <a:rPr lang="en-US" dirty="0"/>
+              <a:t>) + se </a:t>
+            </a:r>
+            <a:r>
+              <a:rPr lang="en-US" dirty="0" err="1"/>
+              <a:t>controllore</a:t>
+            </a:r>
+            <a:r>
+              <a:rPr lang="en-US" dirty="0"/>
+              <a:t>, </a:t>
+            </a:r>
+            <a:r>
+              <a:rPr lang="en-US" dirty="0" err="1"/>
+              <a:t>rimuovi</a:t>
+            </a:r>
+            <a:r>
+              <a:rPr lang="en-US" dirty="0"/>
+              <a:t> 2 </a:t>
+            </a:r>
+            <a:r>
+              <a:rPr lang="en-US" dirty="0" err="1"/>
+              <a:t>simuòlazioni</a:t>
+            </a:r>
+            <a:r>
+              <a:rPr lang="en-US" dirty="0"/>
+              <a:t> del </a:t>
+            </a:r>
+            <a:r>
+              <a:rPr lang="en-US" dirty="0" err="1"/>
+              <a:t>caso</a:t>
+            </a:r>
+            <a:r>
+              <a:rPr lang="en-US" dirty="0"/>
+              <a:t> </a:t>
+            </a:r>
+            <a:r>
+              <a:rPr lang="en-US" dirty="0" err="1"/>
+              <a:t>rigido</a:t>
+            </a:r>
+            <a:endParaRPr lang="en-US" dirty="0"/>
+          </a:p>
+        </p:txBody>
+      </p:sp>
+      <p:sp>
+        <p:nvSpPr>
+          <p:cNvPr id="4" name="Segnaposto numero diapositiva 3"/>
+          <p:cNvSpPr>
+            <a:spLocks noGrp="1"/>
+          </p:cNvSpPr>
+          <p:nvPr>
+            <p:ph type="sldNum" sz="quarter" idx="5"/>
+          </p:nvPr>
+        </p:nvSpPr>
+        <p:spPr/>
+        <p:txBody>
+          <a:bodyPr/>
+          <a:lstStyle/>
+          <a:p>
+            <a:pPr>
+              <a:defRPr/>
+            </a:pPr>
+            <a:fld id="{85CEF955-4F42-4C91-BE5A-4F8E7E1A99DB}" type="slidenum">
+              <a:rPr lang="it-IT" altLang="it-IT" smtClean="0"/>
+              <a:pPr>
+                <a:defRPr/>
+              </a:pPr>
+              <a:t>2</a:t>
+            </a:fld>
+            <a:endParaRPr lang="it-IT" altLang="it-IT"/>
+          </a:p>
+        </p:txBody>
+      </p:sp>
+    </p:spTree>
+    <p:extLst>
+      <p:ext uri="{BB962C8B-B14F-4D97-AF65-F5344CB8AC3E}">
+        <p14:creationId xmlns:p14="http://schemas.microsoft.com/office/powerpoint/2010/main" val="2186902983"/>
+      </p:ext>
+    </p:extLst>
+  </p:cSld>
+  <p:clrMapOvr>
+    <a:masterClrMapping/>
+  </p:clrMapOvr>
+</p:notes>
+</file>
+
+<file path=ppt/notesSlides/notesSlide2.xml><?xml version="1.0" encoding="utf-8"?>
+<p:notes xmlns:a="http://schemas.openxmlformats.org/drawingml/2006/main" xmlns:r="http://schemas.openxmlformats.org/officeDocument/2006/relationships" xmlns:p="http://schemas.openxmlformats.org/presentationml/2006/main">
+  <p:cSld>
+    <p:spTree>
+      <p:nvGrpSpPr>
+        <p:cNvPr id="1" name=""/>
+        <p:cNvGrpSpPr/>
+        <p:nvPr/>
+      </p:nvGrpSpPr>
+      <p:grpSpPr>
+        <a:xfrm>
+          <a:off x="0" y="0"/>
+          <a:ext cx="0" cy="0"/>
+          <a:chOff x="0" y="0"/>
+          <a:chExt cx="0" cy="0"/>
+        </a:xfrm>
+      </p:grpSpPr>
+      <p:sp>
+        <p:nvSpPr>
+          <p:cNvPr id="2" name="Segnaposto immagine diapositiva 1"/>
+          <p:cNvSpPr>
+            <a:spLocks noGrp="1" noRot="1" noChangeAspect="1"/>
+          </p:cNvSpPr>
+          <p:nvPr>
+            <p:ph type="sldImg"/>
+          </p:nvPr>
+        </p:nvSpPr>
+        <p:spPr/>
+      </p:sp>
+      <p:sp>
+        <p:nvSpPr>
+          <p:cNvPr id="3" name="Segnaposto note 2"/>
+          <p:cNvSpPr>
+            <a:spLocks noGrp="1"/>
+          </p:cNvSpPr>
+          <p:nvPr>
+            <p:ph type="body" idx="1"/>
+          </p:nvPr>
+        </p:nvSpPr>
+        <p:spPr/>
+        <p:txBody>
+          <a:bodyPr/>
+          <a:lstStyle/>
+          <a:p>
+            <a:r>
+              <a:rPr lang="en-US" dirty="0" err="1"/>
+              <a:t>Espandere</a:t>
+            </a:r>
+            <a:r>
+              <a:rPr lang="en-US" dirty="0"/>
+              <a:t>, alternative approach è </a:t>
+            </a:r>
+            <a:r>
+              <a:rPr lang="en-US" dirty="0" err="1"/>
+              <a:t>apprendere</a:t>
+            </a:r>
+            <a:r>
+              <a:rPr lang="en-US" dirty="0"/>
+              <a:t> la </a:t>
+            </a:r>
+            <a:r>
+              <a:rPr lang="en-US" dirty="0" err="1"/>
+              <a:t>lagrangiana</a:t>
+            </a:r>
+            <a:r>
+              <a:rPr lang="en-US" dirty="0"/>
+              <a:t> e la </a:t>
+            </a:r>
+            <a:r>
+              <a:rPr lang="en-US" dirty="0" err="1"/>
+              <a:t>imparo</a:t>
+            </a:r>
+            <a:r>
+              <a:rPr lang="en-US" dirty="0"/>
+              <a:t> -&gt; non nota L, la </a:t>
+            </a:r>
+            <a:r>
+              <a:rPr lang="en-US" dirty="0" err="1"/>
+              <a:t>imparo</a:t>
+            </a:r>
+            <a:r>
+              <a:rPr lang="en-US" dirty="0"/>
+              <a:t> (</a:t>
+            </a:r>
+            <a:r>
+              <a:rPr lang="en-US" dirty="0" err="1"/>
+              <a:t>cosi</a:t>
+            </a:r>
+            <a:r>
+              <a:rPr lang="en-US" dirty="0"/>
+              <a:t> so </a:t>
+            </a:r>
+            <a:r>
+              <a:rPr lang="en-US" dirty="0" err="1"/>
+              <a:t>stutto</a:t>
+            </a:r>
+            <a:r>
+              <a:rPr lang="en-US" dirty="0"/>
+              <a:t> </a:t>
+            </a:r>
+            <a:r>
+              <a:rPr lang="en-US" dirty="0" err="1"/>
+              <a:t>sul</a:t>
+            </a:r>
+            <a:r>
+              <a:rPr lang="en-US" dirty="0"/>
+              <a:t> Sistema), come la </a:t>
+            </a:r>
+            <a:r>
+              <a:rPr lang="en-US" dirty="0" err="1"/>
+              <a:t>imparo</a:t>
+            </a:r>
+            <a:r>
+              <a:rPr lang="en-US" dirty="0"/>
+              <a:t>? Non la </a:t>
+            </a:r>
+            <a:r>
+              <a:rPr lang="en-US" dirty="0" err="1"/>
+              <a:t>posso</a:t>
+            </a:r>
+            <a:r>
+              <a:rPr lang="en-US" dirty="0"/>
+              <a:t> </a:t>
+            </a:r>
+            <a:r>
+              <a:rPr lang="en-US" dirty="0" err="1"/>
+              <a:t>misurare</a:t>
+            </a:r>
+            <a:r>
+              <a:rPr lang="en-US" dirty="0"/>
+              <a:t>, </a:t>
+            </a:r>
+            <a:r>
+              <a:rPr lang="en-US" dirty="0" err="1"/>
+              <a:t>allora</a:t>
+            </a:r>
+            <a:r>
+              <a:rPr lang="en-US" dirty="0"/>
+              <a:t> </a:t>
+            </a:r>
+            <a:r>
+              <a:rPr lang="en-US" dirty="0" err="1"/>
+              <a:t>sfrutto</a:t>
+            </a:r>
+            <a:r>
+              <a:rPr lang="en-US" dirty="0"/>
+              <a:t> il </a:t>
+            </a:r>
+            <a:r>
+              <a:rPr lang="en-US" dirty="0" err="1"/>
+              <a:t>fatto</a:t>
+            </a:r>
+            <a:r>
+              <a:rPr lang="en-US" dirty="0"/>
+              <a:t> </a:t>
+            </a:r>
+            <a:r>
+              <a:rPr lang="en-US" dirty="0" err="1"/>
+              <a:t>che</a:t>
+            </a:r>
+            <a:r>
+              <a:rPr lang="en-US" dirty="0"/>
+              <a:t> </a:t>
+            </a:r>
+            <a:r>
+              <a:rPr lang="en-US" dirty="0" err="1"/>
+              <a:t>posso</a:t>
+            </a:r>
+            <a:r>
+              <a:rPr lang="en-US" dirty="0"/>
+              <a:t> </a:t>
+            </a:r>
+            <a:r>
+              <a:rPr lang="en-US" dirty="0" err="1"/>
+              <a:t>misurare</a:t>
+            </a:r>
+            <a:r>
+              <a:rPr lang="en-US" dirty="0"/>
+              <a:t> </a:t>
+            </a:r>
+            <a:r>
+              <a:rPr lang="en-US" dirty="0" err="1"/>
+              <a:t>l’accelerazione</a:t>
+            </a:r>
+            <a:r>
+              <a:rPr lang="en-US" dirty="0"/>
+              <a:t> </a:t>
+            </a:r>
+            <a:r>
+              <a:rPr lang="en-US" dirty="0" err="1"/>
+              <a:t>oppire</a:t>
+            </a:r>
+            <a:r>
+              <a:rPr lang="en-US" dirty="0"/>
+              <a:t> </a:t>
+            </a:r>
+            <a:r>
+              <a:rPr lang="en-US" dirty="0" err="1"/>
+              <a:t>posizione</a:t>
+            </a:r>
+            <a:r>
+              <a:rPr lang="en-US" dirty="0"/>
+              <a:t> </a:t>
+            </a:r>
+            <a:r>
+              <a:rPr lang="en-US" dirty="0" err="1"/>
+              <a:t>evelocità</a:t>
+            </a:r>
+            <a:r>
+              <a:rPr lang="en-US" dirty="0"/>
+              <a:t> e </a:t>
+            </a:r>
+            <a:r>
+              <a:rPr lang="en-US" dirty="0" err="1"/>
+              <a:t>quindi</a:t>
+            </a:r>
+            <a:r>
+              <a:rPr lang="en-US" dirty="0"/>
+              <a:t> </a:t>
+            </a:r>
+            <a:r>
+              <a:rPr lang="en-US" dirty="0" err="1"/>
+              <a:t>sfruttando</a:t>
+            </a:r>
+            <a:r>
+              <a:rPr lang="en-US" dirty="0"/>
+              <a:t> </a:t>
+            </a:r>
+            <a:r>
+              <a:rPr lang="en-US" dirty="0" err="1"/>
+              <a:t>l’automatic</a:t>
+            </a:r>
+            <a:r>
+              <a:rPr lang="en-US" dirty="0"/>
+              <a:t> differentiation data </a:t>
+            </a:r>
+            <a:r>
+              <a:rPr lang="en-US" dirty="0" err="1"/>
+              <a:t>una</a:t>
+            </a:r>
+            <a:r>
+              <a:rPr lang="en-US" dirty="0"/>
+              <a:t> L </a:t>
+            </a:r>
+            <a:r>
+              <a:rPr lang="en-US" dirty="0" err="1"/>
+              <a:t>qualsisasi</a:t>
+            </a:r>
+            <a:r>
+              <a:rPr lang="en-US" dirty="0"/>
+              <a:t> get the q dot </a:t>
+            </a:r>
+            <a:r>
+              <a:rPr lang="en-US" dirty="0" err="1"/>
+              <a:t>dot</a:t>
+            </a:r>
+            <a:r>
+              <a:rPr lang="en-US" dirty="0"/>
+              <a:t>, </a:t>
+            </a:r>
+            <a:r>
+              <a:rPr lang="en-US" dirty="0" err="1"/>
+              <a:t>che</a:t>
+            </a:r>
+            <a:r>
+              <a:rPr lang="en-US" dirty="0"/>
+              <a:t> poi </a:t>
+            </a:r>
+            <a:r>
+              <a:rPr lang="en-US"/>
+              <a:t>integro</a:t>
+            </a:r>
+            <a:endParaRPr lang="en-US" dirty="0"/>
+          </a:p>
+        </p:txBody>
+      </p:sp>
+      <p:sp>
+        <p:nvSpPr>
+          <p:cNvPr id="4" name="Segnaposto numero diapositiva 3"/>
+          <p:cNvSpPr>
+            <a:spLocks noGrp="1"/>
+          </p:cNvSpPr>
+          <p:nvPr>
+            <p:ph type="sldNum" sz="quarter" idx="5"/>
+          </p:nvPr>
+        </p:nvSpPr>
+        <p:spPr/>
+        <p:txBody>
+          <a:bodyPr/>
+          <a:lstStyle/>
+          <a:p>
+            <a:pPr>
+              <a:defRPr/>
+            </a:pPr>
+            <a:fld id="{85CEF955-4F42-4C91-BE5A-4F8E7E1A99DB}" type="slidenum">
+              <a:rPr lang="it-IT" altLang="it-IT" smtClean="0"/>
+              <a:pPr>
+                <a:defRPr/>
+              </a:pPr>
+              <a:t>4</a:t>
+            </a:fld>
+            <a:endParaRPr lang="it-IT" altLang="it-IT"/>
+          </a:p>
+        </p:txBody>
+      </p:sp>
+    </p:spTree>
+    <p:extLst>
+      <p:ext uri="{BB962C8B-B14F-4D97-AF65-F5344CB8AC3E}">
+        <p14:creationId xmlns:p14="http://schemas.microsoft.com/office/powerpoint/2010/main" val="675255502"/>
+      </p:ext>
+    </p:extLst>
+  </p:cSld>
+  <p:clrMapOvr>
+    <a:masterClrMapping/>
+  </p:clrMapOvr>
+</p:notes>
+</file>
+
+<file path=ppt/notesSlides/notesSlide3.xml><?xml version="1.0" encoding="utf-8"?>
+<p:notes xmlns:a="http://schemas.openxmlformats.org/drawingml/2006/main" xmlns:r="http://schemas.openxmlformats.org/officeDocument/2006/relationships" xmlns:p="http://schemas.openxmlformats.org/presentationml/2006/main">
+  <p:cSld>
+    <p:spTree>
+      <p:nvGrpSpPr>
+        <p:cNvPr id="1" name=""/>
+        <p:cNvGrpSpPr/>
+        <p:nvPr/>
+      </p:nvGrpSpPr>
+      <p:grpSpPr>
+        <a:xfrm>
+          <a:off x="0" y="0"/>
+          <a:ext cx="0" cy="0"/>
+          <a:chOff x="0" y="0"/>
+          <a:chExt cx="0" cy="0"/>
+        </a:xfrm>
+      </p:grpSpPr>
+      <p:sp>
+        <p:nvSpPr>
+          <p:cNvPr id="2" name="Segnaposto immagine diapositiva 1"/>
+          <p:cNvSpPr>
+            <a:spLocks noGrp="1" noRot="1" noChangeAspect="1"/>
+          </p:cNvSpPr>
+          <p:nvPr>
+            <p:ph type="sldImg"/>
+          </p:nvPr>
+        </p:nvSpPr>
+        <p:spPr/>
+      </p:sp>
+      <p:sp>
+        <p:nvSpPr>
+          <p:cNvPr id="3" name="Segnaposto note 2"/>
+          <p:cNvSpPr>
+            <a:spLocks noGrp="1"/>
+          </p:cNvSpPr>
+          <p:nvPr>
+            <p:ph type="body" idx="1"/>
+          </p:nvPr>
+        </p:nvSpPr>
+        <p:spPr/>
+        <p:txBody>
+          <a:bodyPr/>
+          <a:lstStyle/>
+          <a:p>
+            <a:r>
+              <a:rPr lang="en-US" dirty="0" err="1"/>
+              <a:t>Perchè</a:t>
+            </a:r>
+            <a:r>
+              <a:rPr lang="en-US" dirty="0"/>
+              <a:t> </a:t>
+            </a:r>
+            <a:r>
+              <a:rPr lang="en-US" dirty="0" err="1"/>
+              <a:t>arriva</a:t>
+            </a:r>
+            <a:r>
+              <a:rPr lang="en-US" dirty="0"/>
+              <a:t> il delay </a:t>
+            </a:r>
+            <a:r>
+              <a:rPr lang="en-US" dirty="0" err="1"/>
+              <a:t>della</a:t>
+            </a:r>
+            <a:r>
+              <a:rPr lang="en-US" dirty="0"/>
+              <a:t> </a:t>
+            </a:r>
+            <a:r>
+              <a:rPr lang="en-US" dirty="0" err="1"/>
+              <a:t>traiettoria</a:t>
+            </a:r>
+            <a:r>
+              <a:rPr lang="en-US" dirty="0"/>
+              <a:t>?</a:t>
+            </a:r>
+            <a:r>
+              <a:rPr lang="en-US" u="none" dirty="0"/>
+              <a:t> Le </a:t>
+            </a:r>
+            <a:r>
+              <a:rPr lang="en-US" u="none" dirty="0" err="1"/>
+              <a:t>algrangiane</a:t>
+            </a:r>
+            <a:r>
+              <a:rPr lang="en-US" u="none" dirty="0"/>
+              <a:t> non </a:t>
+            </a:r>
+            <a:r>
+              <a:rPr lang="en-US" u="none" dirty="0" err="1"/>
+              <a:t>sono</a:t>
+            </a:r>
+            <a:r>
+              <a:rPr lang="en-US" u="none" dirty="0"/>
+              <a:t> </a:t>
+            </a:r>
+            <a:r>
+              <a:rPr lang="en-US" u="none" dirty="0" err="1"/>
+              <a:t>identiche</a:t>
+            </a:r>
+            <a:r>
+              <a:rPr lang="en-US" u="none" dirty="0"/>
+              <a:t>, se </a:t>
+            </a:r>
+            <a:r>
+              <a:rPr lang="en-US" u="none" dirty="0" err="1"/>
+              <a:t>c’è</a:t>
+            </a:r>
+            <a:r>
+              <a:rPr lang="en-US" u="none" dirty="0"/>
+              <a:t> un </a:t>
+            </a:r>
+            <a:r>
+              <a:rPr lang="en-US" u="none" dirty="0" err="1"/>
+              <a:t>errore</a:t>
+            </a:r>
+            <a:r>
+              <a:rPr lang="en-US" u="none" dirty="0"/>
+              <a:t> </a:t>
+            </a:r>
+            <a:r>
+              <a:rPr lang="en-US" u="none" dirty="0" err="1"/>
+              <a:t>che</a:t>
+            </a:r>
+            <a:r>
+              <a:rPr lang="en-US" u="none" dirty="0"/>
+              <a:t> </a:t>
+            </a:r>
+            <a:r>
+              <a:rPr lang="en-US" u="none" dirty="0" err="1"/>
+              <a:t>si</a:t>
+            </a:r>
+            <a:r>
+              <a:rPr lang="en-US" u="none" dirty="0"/>
+              <a:t> </a:t>
+            </a:r>
+            <a:r>
+              <a:rPr lang="en-US" u="none" dirty="0" err="1"/>
+              <a:t>accumula</a:t>
+            </a:r>
+            <a:r>
+              <a:rPr lang="en-US" u="none" dirty="0"/>
+              <a:t> amen (</a:t>
+            </a:r>
+            <a:r>
+              <a:rPr lang="en-US" u="none" dirty="0" err="1"/>
+              <a:t>tuttvaia</a:t>
+            </a:r>
+            <a:r>
+              <a:rPr lang="en-US" u="none" dirty="0"/>
+              <a:t> </a:t>
+            </a:r>
+            <a:r>
+              <a:rPr lang="en-US" u="none" dirty="0" err="1"/>
+              <a:t>energia</a:t>
+            </a:r>
+            <a:r>
+              <a:rPr lang="en-US" u="none" dirty="0"/>
+              <a:t> simile, </a:t>
+            </a:r>
+            <a:r>
+              <a:rPr lang="en-US" u="none" dirty="0" err="1"/>
+              <a:t>tuttavia</a:t>
+            </a:r>
+            <a:r>
+              <a:rPr lang="en-US" u="none" dirty="0"/>
+              <a:t> </a:t>
+            </a:r>
+            <a:r>
+              <a:rPr lang="en-US" u="none" dirty="0" err="1"/>
+              <a:t>simu</a:t>
+            </a:r>
+            <a:r>
+              <a:rPr lang="en-US" u="none" dirty="0"/>
+              <a:t> okay, div </a:t>
+            </a:r>
+            <a:r>
+              <a:rPr lang="en-US" u="none" dirty="0" err="1"/>
+              <a:t>integrazione</a:t>
+            </a:r>
+            <a:r>
+              <a:rPr lang="en-US" u="none" dirty="0"/>
+              <a:t> </a:t>
+            </a:r>
+            <a:r>
+              <a:rPr lang="en-US" u="none" dirty="0" err="1"/>
+              <a:t>accumula</a:t>
+            </a:r>
+            <a:r>
+              <a:rPr lang="en-US" u="none" dirty="0"/>
+              <a:t> </a:t>
+            </a:r>
+            <a:r>
+              <a:rPr lang="en-US" u="none" dirty="0" err="1"/>
+              <a:t>errore</a:t>
+            </a:r>
+            <a:r>
+              <a:rPr lang="en-US" u="none" dirty="0"/>
+              <a:t> per def, </a:t>
+            </a:r>
+            <a:r>
+              <a:rPr lang="en-US" u="none" dirty="0" err="1"/>
+              <a:t>tuttavia</a:t>
+            </a:r>
+            <a:r>
+              <a:rPr lang="en-US" u="none" dirty="0"/>
+              <a:t> </a:t>
+            </a:r>
+            <a:r>
+              <a:rPr lang="en-US" u="none" dirty="0" err="1"/>
+              <a:t>energia</a:t>
+            </a:r>
+            <a:r>
+              <a:rPr lang="en-US" u="none" dirty="0"/>
+              <a:t> è </a:t>
+            </a:r>
+            <a:r>
+              <a:rPr lang="en-US" u="none" dirty="0" err="1"/>
+              <a:t>conservata</a:t>
+            </a:r>
+            <a:r>
+              <a:rPr lang="en-US" u="none" dirty="0"/>
+              <a:t> e molto </a:t>
+            </a:r>
+            <a:r>
+              <a:rPr lang="en-US" u="none" dirty="0" err="1"/>
+              <a:t>vicina</a:t>
+            </a:r>
+            <a:r>
+              <a:rPr lang="en-US" u="none" dirty="0"/>
+              <a:t>, </a:t>
+            </a:r>
+            <a:r>
+              <a:rPr lang="en-US" u="none" dirty="0" err="1"/>
+              <a:t>applicando</a:t>
+            </a:r>
+            <a:r>
+              <a:rPr lang="en-US" u="none" dirty="0"/>
+              <a:t> </a:t>
+            </a:r>
+            <a:r>
+              <a:rPr lang="en-US" u="none" dirty="0" err="1"/>
+              <a:t>controllore</a:t>
+            </a:r>
+            <a:r>
+              <a:rPr lang="en-US" u="none" dirty="0"/>
+              <a:t> model based </a:t>
+            </a:r>
+            <a:r>
+              <a:rPr lang="en-US" u="none" dirty="0" err="1"/>
+              <a:t>dovrenne</a:t>
+            </a:r>
+            <a:r>
+              <a:rPr lang="en-US" u="none" dirty="0"/>
+              <a:t> </a:t>
+            </a:r>
+            <a:r>
+              <a:rPr lang="en-US" u="none" dirty="0" err="1"/>
+              <a:t>funz</a:t>
+            </a:r>
+            <a:r>
+              <a:rPr lang="en-US" u="none" dirty="0"/>
+              <a:t> bene) + </a:t>
+            </a:r>
+            <a:r>
+              <a:rPr lang="en-US" u="none" dirty="0" err="1"/>
+              <a:t>simulazione</a:t>
+            </a:r>
+            <a:r>
+              <a:rPr lang="en-US" u="none" dirty="0"/>
+              <a:t> Sistema </a:t>
+            </a:r>
+            <a:r>
+              <a:rPr lang="en-US" u="none" dirty="0" err="1"/>
+              <a:t>meccanico</a:t>
+            </a:r>
+            <a:r>
+              <a:rPr lang="en-US" u="none" dirty="0"/>
+              <a:t> a tanti secondi (10 min), quasi sempre diverge la </a:t>
+            </a:r>
+            <a:r>
+              <a:rPr lang="en-US" u="none" dirty="0" err="1"/>
+              <a:t>simulazione</a:t>
+            </a:r>
+            <a:endParaRPr lang="en-US" dirty="0"/>
+          </a:p>
+        </p:txBody>
+      </p:sp>
+      <p:sp>
+        <p:nvSpPr>
+          <p:cNvPr id="4" name="Segnaposto numero diapositiva 3"/>
+          <p:cNvSpPr>
+            <a:spLocks noGrp="1"/>
+          </p:cNvSpPr>
+          <p:nvPr>
+            <p:ph type="sldNum" sz="quarter" idx="5"/>
+          </p:nvPr>
+        </p:nvSpPr>
+        <p:spPr/>
+        <p:txBody>
+          <a:bodyPr/>
+          <a:lstStyle/>
+          <a:p>
+            <a:pPr>
+              <a:defRPr/>
+            </a:pPr>
+            <a:fld id="{85CEF955-4F42-4C91-BE5A-4F8E7E1A99DB}" type="slidenum">
+              <a:rPr lang="it-IT" altLang="it-IT" smtClean="0"/>
+              <a:pPr>
+                <a:defRPr/>
+              </a:pPr>
+              <a:t>13</a:t>
+            </a:fld>
+            <a:endParaRPr lang="it-IT" altLang="it-IT"/>
+          </a:p>
+        </p:txBody>
+      </p:sp>
+    </p:spTree>
+    <p:extLst>
+      <p:ext uri="{BB962C8B-B14F-4D97-AF65-F5344CB8AC3E}">
+        <p14:creationId xmlns:p14="http://schemas.microsoft.com/office/powerpoint/2010/main" val="3696889280"/>
+      </p:ext>
+    </p:extLst>
+  </p:cSld>
+  <p:clrMapOvr>
+    <a:masterClrMapping/>
+  </p:clrMapOvr>
+</p:notes>
+</file>
+
+<file path=ppt/notesSlides/notesSlide4.xml><?xml version="1.0" encoding="utf-8"?>
+<p:notes xmlns:a="http://schemas.openxmlformats.org/drawingml/2006/main" xmlns:r="http://schemas.openxmlformats.org/officeDocument/2006/relationships" xmlns:p="http://schemas.openxmlformats.org/presentationml/2006/main">
+  <p:cSld>
+    <p:spTree>
+      <p:nvGrpSpPr>
+        <p:cNvPr id="1" name=""/>
+        <p:cNvGrpSpPr/>
+        <p:nvPr/>
+      </p:nvGrpSpPr>
+      <p:grpSpPr>
+        <a:xfrm>
+          <a:off x="0" y="0"/>
+          <a:ext cx="0" cy="0"/>
+          <a:chOff x="0" y="0"/>
+          <a:chExt cx="0" cy="0"/>
+        </a:xfrm>
+      </p:grpSpPr>
+      <p:sp>
+        <p:nvSpPr>
+          <p:cNvPr id="2" name="Segnaposto immagine diapositiva 1"/>
+          <p:cNvSpPr>
+            <a:spLocks noGrp="1" noRot="1" noChangeAspect="1"/>
+          </p:cNvSpPr>
+          <p:nvPr>
+            <p:ph type="sldImg"/>
+          </p:nvPr>
+        </p:nvSpPr>
+        <p:spPr/>
+      </p:sp>
+      <p:sp>
+        <p:nvSpPr>
+          <p:cNvPr id="3" name="Segnaposto note 2"/>
+          <p:cNvSpPr>
+            <a:spLocks noGrp="1"/>
+          </p:cNvSpPr>
+          <p:nvPr>
+            <p:ph type="body" idx="1"/>
+          </p:nvPr>
+        </p:nvSpPr>
+        <p:spPr/>
+        <p:txBody>
+          <a:bodyPr/>
+          <a:lstStyle/>
+          <a:p>
+            <a:r>
+              <a:rPr lang="en-US" dirty="0"/>
+              <a:t>SPECIFICARE PERCHE DIVERSE SCALE DI UPDATES</a:t>
+            </a:r>
+          </a:p>
+        </p:txBody>
+      </p:sp>
+      <p:sp>
+        <p:nvSpPr>
+          <p:cNvPr id="4" name="Segnaposto numero diapositiva 3"/>
+          <p:cNvSpPr>
+            <a:spLocks noGrp="1"/>
+          </p:cNvSpPr>
+          <p:nvPr>
+            <p:ph type="sldNum" sz="quarter" idx="5"/>
+          </p:nvPr>
+        </p:nvSpPr>
+        <p:spPr/>
+        <p:txBody>
+          <a:bodyPr/>
+          <a:lstStyle/>
+          <a:p>
+            <a:pPr>
+              <a:defRPr/>
+            </a:pPr>
+            <a:fld id="{85CEF955-4F42-4C91-BE5A-4F8E7E1A99DB}" type="slidenum">
+              <a:rPr lang="it-IT" altLang="it-IT" smtClean="0"/>
+              <a:pPr>
+                <a:defRPr/>
+              </a:pPr>
+              <a:t>19</a:t>
+            </a:fld>
+            <a:endParaRPr lang="it-IT" altLang="it-IT"/>
+          </a:p>
+        </p:txBody>
+      </p:sp>
+    </p:spTree>
+    <p:extLst>
+      <p:ext uri="{BB962C8B-B14F-4D97-AF65-F5344CB8AC3E}">
+        <p14:creationId xmlns:p14="http://schemas.microsoft.com/office/powerpoint/2010/main" val="4014070131"/>
+      </p:ext>
+    </p:extLst>
+  </p:cSld>
+  <p:clrMapOvr>
+    <a:masterClrMapping/>
+  </p:clrMapOvr>
+</p:notes>
+</file>
+
+<file path=ppt/notesSlides/notesSlide5.xml><?xml version="1.0" encoding="utf-8"?>
+<p:notes xmlns:a="http://schemas.openxmlformats.org/drawingml/2006/main" xmlns:r="http://schemas.openxmlformats.org/officeDocument/2006/relationships" xmlns:p="http://schemas.openxmlformats.org/presentationml/2006/main">
+  <p:cSld>
+    <p:spTree>
+      <p:nvGrpSpPr>
+        <p:cNvPr id="1" name=""/>
+        <p:cNvGrpSpPr/>
+        <p:nvPr/>
+      </p:nvGrpSpPr>
+      <p:grpSpPr>
+        <a:xfrm>
+          <a:off x="0" y="0"/>
+          <a:ext cx="0" cy="0"/>
+          <a:chOff x="0" y="0"/>
+          <a:chExt cx="0" cy="0"/>
+        </a:xfrm>
+      </p:grpSpPr>
+      <p:sp>
+        <p:nvSpPr>
+          <p:cNvPr id="2" name="Segnaposto immagine diapositiva 1"/>
+          <p:cNvSpPr>
+            <a:spLocks noGrp="1" noRot="1" noChangeAspect="1"/>
+          </p:cNvSpPr>
+          <p:nvPr>
+            <p:ph type="sldImg"/>
+          </p:nvPr>
+        </p:nvSpPr>
+        <p:spPr/>
+      </p:sp>
+      <p:sp>
+        <p:nvSpPr>
+          <p:cNvPr id="3" name="Segnaposto note 2"/>
+          <p:cNvSpPr>
+            <a:spLocks noGrp="1"/>
+          </p:cNvSpPr>
+          <p:nvPr>
+            <p:ph type="body" idx="1"/>
+          </p:nvPr>
+        </p:nvSpPr>
+        <p:spPr/>
+        <p:txBody>
+          <a:bodyPr/>
+          <a:lstStyle/>
+          <a:p>
             <a:endParaRPr lang="en-US" dirty="0"/>
           </a:p>
         </p:txBody>
@@ -1040,6 +2003,132 @@
     <p:extLst>
       <p:ext uri="{BB962C8B-B14F-4D97-AF65-F5344CB8AC3E}">
         <p14:creationId xmlns:p14="http://schemas.microsoft.com/office/powerpoint/2010/main" val="3679747326"/>
+      </p:ext>
+    </p:extLst>
+  </p:cSld>
+  <p:clrMapOvr>
+    <a:masterClrMapping/>
+  </p:clrMapOvr>
+</p:notes>
+</file>
+
+<file path=ppt/notesSlides/notesSlide6.xml><?xml version="1.0" encoding="utf-8"?>
+<p:notes xmlns:a="http://schemas.openxmlformats.org/drawingml/2006/main" xmlns:r="http://schemas.openxmlformats.org/officeDocument/2006/relationships" xmlns:p="http://schemas.openxmlformats.org/presentationml/2006/main">
+  <p:cSld>
+    <p:spTree>
+      <p:nvGrpSpPr>
+        <p:cNvPr id="1" name=""/>
+        <p:cNvGrpSpPr/>
+        <p:nvPr/>
+      </p:nvGrpSpPr>
+      <p:grpSpPr>
+        <a:xfrm>
+          <a:off x="0" y="0"/>
+          <a:ext cx="0" cy="0"/>
+          <a:chOff x="0" y="0"/>
+          <a:chExt cx="0" cy="0"/>
+        </a:xfrm>
+      </p:grpSpPr>
+      <p:sp>
+        <p:nvSpPr>
+          <p:cNvPr id="2" name="Segnaposto immagine diapositiva 1"/>
+          <p:cNvSpPr>
+            <a:spLocks noGrp="1" noRot="1" noChangeAspect="1"/>
+          </p:cNvSpPr>
+          <p:nvPr>
+            <p:ph type="sldImg"/>
+          </p:nvPr>
+        </p:nvSpPr>
+        <p:spPr/>
+      </p:sp>
+      <p:sp>
+        <p:nvSpPr>
+          <p:cNvPr id="3" name="Segnaposto note 2"/>
+          <p:cNvSpPr>
+            <a:spLocks noGrp="1"/>
+          </p:cNvSpPr>
+          <p:nvPr>
+            <p:ph type="body" idx="1"/>
+          </p:nvPr>
+        </p:nvSpPr>
+        <p:spPr/>
+        <p:txBody>
+          <a:bodyPr/>
+          <a:lstStyle/>
+          <a:p>
+            <a:r>
+              <a:rPr lang="en-US" dirty="0" err="1"/>
+              <a:t>Lìinfo</a:t>
+            </a:r>
+            <a:r>
+              <a:rPr lang="en-US" dirty="0"/>
+              <a:t> </a:t>
+            </a:r>
+            <a:r>
+              <a:rPr lang="en-US" dirty="0" err="1"/>
+              <a:t>interessante</a:t>
+            </a:r>
+            <a:r>
+              <a:rPr lang="en-US" dirty="0"/>
+              <a:t> non è il </a:t>
+            </a:r>
+            <a:r>
+              <a:rPr lang="en-US" dirty="0" err="1"/>
+              <a:t>valore</a:t>
+            </a:r>
+            <a:r>
+              <a:rPr lang="en-US" dirty="0"/>
+              <a:t> basso di loss, ma </a:t>
+            </a:r>
+            <a:r>
+              <a:rPr lang="en-US" dirty="0" err="1"/>
+              <a:t>che</a:t>
+            </a:r>
+            <a:r>
+              <a:rPr lang="en-US" dirty="0"/>
+              <a:t> non cala </a:t>
+            </a:r>
+            <a:r>
+              <a:rPr lang="en-US"/>
+              <a:t>+ INSERISCI STRUTTURA CONFIGURAZIONE</a:t>
+            </a:r>
+            <a:endParaRPr lang="en-US" dirty="0"/>
+          </a:p>
+        </p:txBody>
+      </p:sp>
+      <p:sp>
+        <p:nvSpPr>
+          <p:cNvPr id="4" name="Segnaposto numero diapositiva 3"/>
+          <p:cNvSpPr>
+            <a:spLocks noGrp="1"/>
+          </p:cNvSpPr>
+          <p:nvPr>
+            <p:ph type="sldNum" sz="quarter" idx="5"/>
+          </p:nvPr>
+        </p:nvSpPr>
+        <p:spPr/>
+        <p:txBody>
+          <a:bodyPr/>
+          <a:lstStyle/>
+          <a:p>
+            <a:pPr>
+              <a:defRPr/>
+            </a:pPr>
+            <a:fld id="{85CEF955-4F42-4C91-BE5A-4F8E7E1A99DB}" type="slidenum">
+              <a:rPr lang="it-IT" altLang="it-IT" smtClean="0"/>
+              <a:pPr>
+                <a:defRPr/>
+              </a:pPr>
+              <a:t>24</a:t>
+            </a:fld>
+            <a:endParaRPr lang="it-IT" altLang="it-IT"/>
+          </a:p>
+        </p:txBody>
+      </p:sp>
+    </p:spTree>
+    <p:extLst>
+      <p:ext uri="{BB962C8B-B14F-4D97-AF65-F5344CB8AC3E}">
+        <p14:creationId xmlns:p14="http://schemas.microsoft.com/office/powerpoint/2010/main" val="2617545748"/>
       </p:ext>
     </p:extLst>
   </p:cSld>
@@ -4453,7 +5542,7 @@
                 <a:latin typeface="Calibri" panose="020F0502020204030204" pitchFamily="34" charset="0"/>
                 <a:ea typeface="ＭＳ Ｐゴシック" panose="020B0600070205080204" pitchFamily="34" charset="-128"/>
               </a:rPr>
-              <a:t> Neural Network applied to elastic robots</a:t>
+              <a:t> Neural Networks applied to elastic robots</a:t>
             </a:r>
             <a:endParaRPr lang="en-US" altLang="it-IT" b="0" i="1" kern="0" dirty="0">
               <a:ln w="0"/>
@@ -5045,8 +6134,8 @@
           </a:p>
         </p:txBody>
       </p:sp>
-      <mc:AlternateContent xmlns:mc="http://schemas.openxmlformats.org/markup-compatibility/2006">
-        <mc:Choice xmlns:a14="http://schemas.microsoft.com/office/drawing/2010/main" Requires="a14">
+      <mc:AlternateContent xmlns:mc="http://schemas.openxmlformats.org/markup-compatibility/2006" xmlns:a14="http://schemas.microsoft.com/office/drawing/2010/main">
+        <mc:Choice Requires="a14">
           <p:graphicFrame>
             <p:nvGraphicFramePr>
               <p:cNvPr id="5" name="Tabella 4">
@@ -5743,7 +6832,7 @@
             </a:graphic>
           </p:graphicFrame>
         </mc:Choice>
-        <mc:Fallback>
+        <mc:Fallback xmlns="">
           <p:graphicFrame>
             <p:nvGraphicFramePr>
               <p:cNvPr id="5" name="Tabella 4">
@@ -7761,7 +8850,7 @@
             <p:nvPr/>
           </p:nvPicPr>
           <p:blipFill>
-            <a:blip r:embed="rId2"/>
+            <a:blip r:embed="rId3"/>
             <a:stretch>
               <a:fillRect/>
             </a:stretch>
@@ -7791,7 +8880,7 @@
             <p:nvPr/>
           </p:nvPicPr>
           <p:blipFill>
-            <a:blip r:embed="rId3"/>
+            <a:blip r:embed="rId4"/>
             <a:stretch>
               <a:fillRect/>
             </a:stretch>
@@ -10078,8 +11167,8 @@
           </a:p>
         </p:txBody>
       </p:sp>
-      <mc:AlternateContent xmlns:mc="http://schemas.openxmlformats.org/markup-compatibility/2006">
-        <mc:Choice xmlns:a14="http://schemas.microsoft.com/office/drawing/2010/main" Requires="a14">
+      <mc:AlternateContent xmlns:mc="http://schemas.openxmlformats.org/markup-compatibility/2006" xmlns:a14="http://schemas.microsoft.com/office/drawing/2010/main">
+        <mc:Choice Requires="a14">
           <p:graphicFrame>
             <p:nvGraphicFramePr>
               <p:cNvPr id="5" name="Tabella 4">
@@ -10851,7 +11940,7 @@
             </a:graphic>
           </p:graphicFrame>
         </mc:Choice>
-        <mc:Fallback>
+        <mc:Fallback xmlns="">
           <p:graphicFrame>
             <p:nvGraphicFramePr>
               <p:cNvPr id="5" name="Tabella 4">
@@ -12020,7 +13109,7 @@
             <p:nvPr/>
           </p:nvPicPr>
           <p:blipFill>
-            <a:blip r:embed="rId2"/>
+            <a:blip r:embed="rId3"/>
             <a:srcRect/>
             <a:stretch/>
           </p:blipFill>
@@ -12049,7 +13138,7 @@
             <p:nvPr/>
           </p:nvPicPr>
           <p:blipFill>
-            <a:blip r:embed="rId3"/>
+            <a:blip r:embed="rId4"/>
             <a:srcRect/>
             <a:stretch/>
           </p:blipFill>
@@ -12444,7 +13533,7 @@
             <p:nvPr/>
           </p:nvPicPr>
           <p:blipFill rotWithShape="1">
-            <a:blip r:embed="rId2"/>
+            <a:blip r:embed="rId3"/>
             <a:srcRect l="21650" t="12200" r="16526" b="27951"/>
             <a:stretch/>
           </p:blipFill>
@@ -12473,7 +13562,7 @@
             <p:nvPr/>
           </p:nvPicPr>
           <p:blipFill>
-            <a:blip r:embed="rId3"/>
+            <a:blip r:embed="rId4"/>
             <a:stretch>
               <a:fillRect/>
             </a:stretch>
@@ -16133,7 +17222,7 @@
             <p:nvPr/>
           </p:nvPicPr>
           <p:blipFill>
-            <a:blip r:embed="rId2"/>
+            <a:blip r:embed="rId3"/>
             <a:srcRect/>
             <a:stretch/>
           </p:blipFill>
@@ -16162,7 +17251,7 @@
             <p:nvPr/>
           </p:nvPicPr>
           <p:blipFill>
-            <a:blip r:embed="rId3"/>
+            <a:blip r:embed="rId4"/>
             <a:srcRect/>
             <a:stretch/>
           </p:blipFill>
@@ -21764,7 +22853,7 @@
                 <a:avLst/>
               </a:prstGeom>
               <a:blipFill>
-                <a:blip r:embed="rId2"/>
+                <a:blip r:embed="rId3"/>
                 <a:stretch>
                   <a:fillRect/>
                 </a:stretch>
@@ -26989,7 +28078,23 @@
                   <a:srgbClr val="000000"/>
                 </a:solidFill>
               </a:rPr>
-              <a:t> Introduce noise</a:t>
+              <a:t> Introduce </a:t>
+            </a:r>
+            <a:r>
+              <a:rPr lang="en-US" sz="2000" dirty="0" err="1">
+                <a:solidFill>
+                  <a:srgbClr val="000000"/>
+                </a:solidFill>
+              </a:rPr>
+              <a:t>measurament</a:t>
+            </a:r>
+            <a:r>
+              <a:rPr lang="en-US" sz="2000" dirty="0">
+                <a:solidFill>
+                  <a:srgbClr val="000000"/>
+                </a:solidFill>
+              </a:rPr>
+              <a:t> noise</a:t>
             </a:r>
           </a:p>
           <a:p>

</xml_diff>